<commit_message>
adding method for algorithmically generating cases
</commit_message>
<xml_diff>
--- a/experiment/materials/images/economies/economies.pptx
+++ b/experiment/materials/images/economies/economies.pptx
@@ -6,9 +6,22 @@
   </p:sldMasterIdLst>
   <p:sldIdLst>
     <p:sldId id="263" r:id="rId2"/>
-    <p:sldId id="258" r:id="rId3"/>
-    <p:sldId id="264" r:id="rId4"/>
-    <p:sldId id="265" r:id="rId5"/>
+    <p:sldId id="282" r:id="rId3"/>
+    <p:sldId id="266" r:id="rId4"/>
+    <p:sldId id="283" r:id="rId5"/>
+    <p:sldId id="273" r:id="rId6"/>
+    <p:sldId id="274" r:id="rId7"/>
+    <p:sldId id="275" r:id="rId8"/>
+    <p:sldId id="267" r:id="rId9"/>
+    <p:sldId id="284" r:id="rId10"/>
+    <p:sldId id="276" r:id="rId11"/>
+    <p:sldId id="277" r:id="rId12"/>
+    <p:sldId id="278" r:id="rId13"/>
+    <p:sldId id="285" r:id="rId14"/>
+    <p:sldId id="258" r:id="rId15"/>
+    <p:sldId id="279" r:id="rId16"/>
+    <p:sldId id="280" r:id="rId17"/>
+    <p:sldId id="281" r:id="rId18"/>
   </p:sldIdLst>
   <p:sldSz cx="6665913" cy="987425"/>
   <p:notesSz cx="6858000" cy="9144000"/>
@@ -246,7 +259,7 @@
           <a:p>
             <a:fld id="{DA0EE935-E9AF-7B48-BD90-8AB4BA8C33E5}" type="datetimeFigureOut">
               <a:rPr lang="en-US" smtClean="0"/>
-              <a:t>12/14/20</a:t>
+              <a:t>12/23/20</a:t>
             </a:fld>
             <a:endParaRPr lang="en-US"/>
           </a:p>
@@ -416,7 +429,7 @@
           <a:p>
             <a:fld id="{DA0EE935-E9AF-7B48-BD90-8AB4BA8C33E5}" type="datetimeFigureOut">
               <a:rPr lang="en-US" smtClean="0"/>
-              <a:t>12/14/20</a:t>
+              <a:t>12/23/20</a:t>
             </a:fld>
             <a:endParaRPr lang="en-US"/>
           </a:p>
@@ -596,7 +609,7 @@
           <a:p>
             <a:fld id="{DA0EE935-E9AF-7B48-BD90-8AB4BA8C33E5}" type="datetimeFigureOut">
               <a:rPr lang="en-US" smtClean="0"/>
-              <a:t>12/14/20</a:t>
+              <a:t>12/23/20</a:t>
             </a:fld>
             <a:endParaRPr lang="en-US"/>
           </a:p>
@@ -766,7 +779,7 @@
           <a:p>
             <a:fld id="{DA0EE935-E9AF-7B48-BD90-8AB4BA8C33E5}" type="datetimeFigureOut">
               <a:rPr lang="en-US" smtClean="0"/>
-              <a:t>12/14/20</a:t>
+              <a:t>12/23/20</a:t>
             </a:fld>
             <a:endParaRPr lang="en-US"/>
           </a:p>
@@ -1012,7 +1025,7 @@
           <a:p>
             <a:fld id="{DA0EE935-E9AF-7B48-BD90-8AB4BA8C33E5}" type="datetimeFigureOut">
               <a:rPr lang="en-US" smtClean="0"/>
-              <a:t>12/14/20</a:t>
+              <a:t>12/23/20</a:t>
             </a:fld>
             <a:endParaRPr lang="en-US"/>
           </a:p>
@@ -1244,7 +1257,7 @@
           <a:p>
             <a:fld id="{DA0EE935-E9AF-7B48-BD90-8AB4BA8C33E5}" type="datetimeFigureOut">
               <a:rPr lang="en-US" smtClean="0"/>
-              <a:t>12/14/20</a:t>
+              <a:t>12/23/20</a:t>
             </a:fld>
             <a:endParaRPr lang="en-US"/>
           </a:p>
@@ -1611,7 +1624,7 @@
           <a:p>
             <a:fld id="{DA0EE935-E9AF-7B48-BD90-8AB4BA8C33E5}" type="datetimeFigureOut">
               <a:rPr lang="en-US" smtClean="0"/>
-              <a:t>12/14/20</a:t>
+              <a:t>12/23/20</a:t>
             </a:fld>
             <a:endParaRPr lang="en-US"/>
           </a:p>
@@ -1729,7 +1742,7 @@
           <a:p>
             <a:fld id="{DA0EE935-E9AF-7B48-BD90-8AB4BA8C33E5}" type="datetimeFigureOut">
               <a:rPr lang="en-US" smtClean="0"/>
-              <a:t>12/14/20</a:t>
+              <a:t>12/23/20</a:t>
             </a:fld>
             <a:endParaRPr lang="en-US"/>
           </a:p>
@@ -1824,7 +1837,7 @@
           <a:p>
             <a:fld id="{DA0EE935-E9AF-7B48-BD90-8AB4BA8C33E5}" type="datetimeFigureOut">
               <a:rPr lang="en-US" smtClean="0"/>
-              <a:t>12/14/20</a:t>
+              <a:t>12/23/20</a:t>
             </a:fld>
             <a:endParaRPr lang="en-US"/>
           </a:p>
@@ -2101,7 +2114,7 @@
           <a:p>
             <a:fld id="{DA0EE935-E9AF-7B48-BD90-8AB4BA8C33E5}" type="datetimeFigureOut">
               <a:rPr lang="en-US" smtClean="0"/>
-              <a:t>12/14/20</a:t>
+              <a:t>12/23/20</a:t>
             </a:fld>
             <a:endParaRPr lang="en-US"/>
           </a:p>
@@ -2358,7 +2371,7 @@
           <a:p>
             <a:fld id="{DA0EE935-E9AF-7B48-BD90-8AB4BA8C33E5}" type="datetimeFigureOut">
               <a:rPr lang="en-US" smtClean="0"/>
-              <a:t>12/14/20</a:t>
+              <a:t>12/23/20</a:t>
             </a:fld>
             <a:endParaRPr lang="en-US"/>
           </a:p>
@@ -2571,7 +2584,7 @@
           <a:p>
             <a:fld id="{DA0EE935-E9AF-7B48-BD90-8AB4BA8C33E5}" type="datetimeFigureOut">
               <a:rPr lang="en-US" smtClean="0"/>
-              <a:t>12/14/20</a:t>
+              <a:t>12/23/20</a:t>
             </a:fld>
             <a:endParaRPr lang="en-US"/>
           </a:p>
@@ -3372,7 +3385,7 @@
 </p:sld>
 </file>
 
-<file path=ppt/slides/slide2.xml><?xml version="1.0" encoding="utf-8"?>
+<file path=ppt/slides/slide10.xml><?xml version="1.0" encoding="utf-8"?>
 <p:sld xmlns:a="http://schemas.openxmlformats.org/drawingml/2006/main" xmlns:r="http://schemas.openxmlformats.org/officeDocument/2006/relationships" xmlns:p="http://schemas.openxmlformats.org/presentationml/2006/main">
   <p:cSld>
     <p:spTree>
@@ -3453,17 +3466,47 @@
                 <a:ea typeface="Helvetica Neue Medium" panose="02000503000000020004" pitchFamily="2" charset="0"/>
                 <a:cs typeface="Helvetica Neue Medium" panose="02000503000000020004" pitchFamily="2" charset="0"/>
               </a:rPr>
-              <a:t>High retirement savings</a:t>
-            </a:r>
-          </a:p>
-        </p:txBody>
-      </p:sp>
-      <p:sp>
-        <p:nvSpPr>
-          <p:cNvPr id="8" name="Rounded Rectangle 7">
+              <a:t>Normal retirement savings</a:t>
+            </a:r>
+          </a:p>
+        </p:txBody>
+      </p:sp>
+    </p:spTree>
+    <p:extLst>
+      <p:ext uri="{BB962C8B-B14F-4D97-AF65-F5344CB8AC3E}">
+        <p14:creationId xmlns:p14="http://schemas.microsoft.com/office/powerpoint/2010/main" val="3078267720"/>
+      </p:ext>
+    </p:extLst>
+  </p:cSld>
+  <p:clrMapOvr>
+    <a:masterClrMapping/>
+  </p:clrMapOvr>
+</p:sld>
+</file>
+
+<file path=ppt/slides/slide11.xml><?xml version="1.0" encoding="utf-8"?>
+<p:sld xmlns:a="http://schemas.openxmlformats.org/drawingml/2006/main" xmlns:r="http://schemas.openxmlformats.org/officeDocument/2006/relationships" xmlns:p="http://schemas.openxmlformats.org/presentationml/2006/main">
+  <p:cSld>
+    <p:spTree>
+      <p:nvGrpSpPr>
+        <p:cNvPr id="1" name=""/>
+        <p:cNvGrpSpPr/>
+        <p:nvPr/>
+      </p:nvGrpSpPr>
+      <p:grpSpPr>
+        <a:xfrm>
+          <a:off x="0" y="0"/>
+          <a:ext cx="0" cy="0"/>
+          <a:chOff x="0" y="0"/>
+          <a:chExt cx="0" cy="0"/>
+        </a:xfrm>
+      </p:grpSpPr>
+      <p:sp>
+        <p:nvSpPr>
+          <p:cNvPr id="6" name="Rounded Rectangle 5">
             <a:extLst>
               <a:ext uri="{FF2B5EF4-FFF2-40B4-BE49-F238E27FC236}">
-                <a16:creationId xmlns:a16="http://schemas.microsoft.com/office/drawing/2014/main" id="{113C0142-E6EA-5A45-934A-7819FD86E179}"/>
+                <a16:creationId xmlns:a16="http://schemas.microsoft.com/office/drawing/2014/main" id="{8AA4C072-4BF5-9548-9AF0-23891D0D46B7}"/>
               </a:ext>
             </a:extLst>
           </p:cNvPr>
@@ -3472,8 +3515,8 @@
         </p:nvSpPr>
         <p:spPr>
           <a:xfrm>
-            <a:off x="-1924" y="299243"/>
-            <a:ext cx="2560932" cy="389938"/>
+            <a:off x="3459722" y="0"/>
+            <a:ext cx="3206191" cy="374190"/>
           </a:xfrm>
           <a:prstGeom prst="roundRect">
             <a:avLst/>
@@ -3522,11 +3565,695 @@
                 <a:ea typeface="Helvetica Neue Medium" panose="02000503000000020004" pitchFamily="2" charset="0"/>
                 <a:cs typeface="Helvetica Neue Medium" panose="02000503000000020004" pitchFamily="2" charset="0"/>
               </a:rPr>
-              <a:t>Low interest rates</a:t>
-            </a:r>
-          </a:p>
-        </p:txBody>
-      </p:sp>
+              <a:t>???</a:t>
+            </a:r>
+          </a:p>
+        </p:txBody>
+      </p:sp>
+    </p:spTree>
+    <p:extLst>
+      <p:ext uri="{BB962C8B-B14F-4D97-AF65-F5344CB8AC3E}">
+        <p14:creationId xmlns:p14="http://schemas.microsoft.com/office/powerpoint/2010/main" val="3807020776"/>
+      </p:ext>
+    </p:extLst>
+  </p:cSld>
+  <p:clrMapOvr>
+    <a:masterClrMapping/>
+  </p:clrMapOvr>
+</p:sld>
+</file>
+
+<file path=ppt/slides/slide12.xml><?xml version="1.0" encoding="utf-8"?>
+<p:sld xmlns:a="http://schemas.openxmlformats.org/drawingml/2006/main" xmlns:r="http://schemas.openxmlformats.org/officeDocument/2006/relationships" xmlns:p="http://schemas.openxmlformats.org/presentationml/2006/main">
+  <p:cSld>
+    <p:spTree>
+      <p:nvGrpSpPr>
+        <p:cNvPr id="1" name=""/>
+        <p:cNvGrpSpPr/>
+        <p:nvPr/>
+      </p:nvGrpSpPr>
+      <p:grpSpPr>
+        <a:xfrm>
+          <a:off x="0" y="0"/>
+          <a:ext cx="0" cy="0"/>
+          <a:chOff x="0" y="0"/>
+          <a:chExt cx="0" cy="0"/>
+        </a:xfrm>
+      </p:grpSpPr>
+      <p:sp>
+        <p:nvSpPr>
+          <p:cNvPr id="6" name="Rounded Rectangle 5">
+            <a:extLst>
+              <a:ext uri="{FF2B5EF4-FFF2-40B4-BE49-F238E27FC236}">
+                <a16:creationId xmlns:a16="http://schemas.microsoft.com/office/drawing/2014/main" id="{8AA4C072-4BF5-9548-9AF0-23891D0D46B7}"/>
+              </a:ext>
+            </a:extLst>
+          </p:cNvPr>
+          <p:cNvSpPr/>
+          <p:nvPr/>
+        </p:nvSpPr>
+        <p:spPr>
+          <a:xfrm>
+            <a:off x="3459722" y="0"/>
+            <a:ext cx="3206191" cy="374190"/>
+          </a:xfrm>
+          <a:prstGeom prst="roundRect">
+            <a:avLst/>
+          </a:prstGeom>
+          <a:solidFill>
+            <a:schemeClr val="bg1">
+              <a:lumMod val="85000"/>
+            </a:schemeClr>
+          </a:solidFill>
+          <a:ln>
+            <a:noFill/>
+          </a:ln>
+        </p:spPr>
+        <p:style>
+          <a:lnRef idx="2">
+            <a:schemeClr val="accent1">
+              <a:shade val="50000"/>
+            </a:schemeClr>
+          </a:lnRef>
+          <a:fillRef idx="1">
+            <a:schemeClr val="accent1"/>
+          </a:fillRef>
+          <a:effectRef idx="0">
+            <a:schemeClr val="accent1"/>
+          </a:effectRef>
+          <a:fontRef idx="minor">
+            <a:schemeClr val="lt1"/>
+          </a:fontRef>
+        </p:style>
+        <p:txBody>
+          <a:bodyPr rot="0" spcFirstLastPara="0" vertOverflow="overflow" horzOverflow="overflow" vert="horz" wrap="square" lIns="91440" tIns="45720" rIns="91440" bIns="45720" numCol="1" spcCol="0" rtlCol="0" fromWordArt="0" anchor="ctr" anchorCtr="0" forceAA="0" compatLnSpc="1">
+            <a:prstTxWarp prst="textNoShape">
+              <a:avLst/>
+            </a:prstTxWarp>
+            <a:noAutofit/>
+          </a:bodyPr>
+          <a:lstStyle/>
+          <a:p>
+            <a:pPr algn="ctr"/>
+            <a:r>
+              <a:rPr lang="en-US" sz="1800" b="1" dirty="0">
+                <a:solidFill>
+                  <a:schemeClr val="tx1"/>
+                </a:solidFill>
+                <a:latin typeface="Helvetica" pitchFamily="2" charset="0"/>
+                <a:ea typeface="Helvetica Neue Medium" panose="02000503000000020004" pitchFamily="2" charset="0"/>
+                <a:cs typeface="Helvetica Neue Medium" panose="02000503000000020004" pitchFamily="2" charset="0"/>
+              </a:rPr>
+              <a:t>_____</a:t>
+            </a:r>
+          </a:p>
+        </p:txBody>
+      </p:sp>
+    </p:spTree>
+    <p:extLst>
+      <p:ext uri="{BB962C8B-B14F-4D97-AF65-F5344CB8AC3E}">
+        <p14:creationId xmlns:p14="http://schemas.microsoft.com/office/powerpoint/2010/main" val="2615475280"/>
+      </p:ext>
+    </p:extLst>
+  </p:cSld>
+  <p:clrMapOvr>
+    <a:masterClrMapping/>
+  </p:clrMapOvr>
+</p:sld>
+</file>
+
+<file path=ppt/slides/slide13.xml><?xml version="1.0" encoding="utf-8"?>
+<p:sld xmlns:a="http://schemas.openxmlformats.org/drawingml/2006/main" xmlns:r="http://schemas.openxmlformats.org/officeDocument/2006/relationships" xmlns:p="http://schemas.openxmlformats.org/presentationml/2006/main">
+  <p:cSld>
+    <p:bg>
+      <p:bgPr>
+        <a:solidFill>
+          <a:schemeClr val="bg1">
+            <a:alpha val="0"/>
+          </a:schemeClr>
+        </a:solidFill>
+        <a:effectLst/>
+      </p:bgPr>
+    </p:bg>
+    <p:spTree>
+      <p:nvGrpSpPr>
+        <p:cNvPr id="1" name=""/>
+        <p:cNvGrpSpPr/>
+        <p:nvPr/>
+      </p:nvGrpSpPr>
+      <p:grpSpPr>
+        <a:xfrm>
+          <a:off x="0" y="0"/>
+          <a:ext cx="0" cy="0"/>
+          <a:chOff x="0" y="0"/>
+          <a:chExt cx="0" cy="0"/>
+        </a:xfrm>
+      </p:grpSpPr>
+      <p:sp>
+        <p:nvSpPr>
+          <p:cNvPr id="17" name="Rounded Rectangle 16">
+            <a:extLst>
+              <a:ext uri="{FF2B5EF4-FFF2-40B4-BE49-F238E27FC236}">
+                <a16:creationId xmlns:a16="http://schemas.microsoft.com/office/drawing/2014/main" id="{8E9AE9C6-EBE8-8F46-A7A2-D2E2E2C711E9}"/>
+              </a:ext>
+            </a:extLst>
+          </p:cNvPr>
+          <p:cNvSpPr/>
+          <p:nvPr/>
+        </p:nvSpPr>
+        <p:spPr>
+          <a:xfrm>
+            <a:off x="3459721" y="614234"/>
+            <a:ext cx="3206191" cy="374190"/>
+          </a:xfrm>
+          <a:prstGeom prst="roundRect">
+            <a:avLst/>
+          </a:prstGeom>
+          <a:solidFill>
+            <a:schemeClr val="bg1">
+              <a:lumMod val="85000"/>
+            </a:schemeClr>
+          </a:solidFill>
+          <a:ln>
+            <a:noFill/>
+          </a:ln>
+        </p:spPr>
+        <p:style>
+          <a:lnRef idx="2">
+            <a:schemeClr val="accent1">
+              <a:shade val="50000"/>
+            </a:schemeClr>
+          </a:lnRef>
+          <a:fillRef idx="1">
+            <a:schemeClr val="accent1"/>
+          </a:fillRef>
+          <a:effectRef idx="0">
+            <a:schemeClr val="accent1"/>
+          </a:effectRef>
+          <a:fontRef idx="minor">
+            <a:schemeClr val="lt1"/>
+          </a:fontRef>
+        </p:style>
+        <p:txBody>
+          <a:bodyPr rot="0" spcFirstLastPara="0" vertOverflow="overflow" horzOverflow="overflow" vert="horz" wrap="square" lIns="91440" tIns="45720" rIns="91440" bIns="45720" numCol="1" spcCol="0" rtlCol="0" fromWordArt="0" anchor="ctr" anchorCtr="0" forceAA="0" compatLnSpc="1">
+            <a:prstTxWarp prst="textNoShape">
+              <a:avLst/>
+            </a:prstTxWarp>
+            <a:noAutofit/>
+          </a:bodyPr>
+          <a:lstStyle/>
+          <a:p>
+            <a:pPr algn="ctr"/>
+            <a:r>
+              <a:rPr lang="en-US" sz="1800" b="1" dirty="0">
+                <a:solidFill>
+                  <a:schemeClr val="tx1"/>
+                </a:solidFill>
+                <a:latin typeface="Helvetica" pitchFamily="2" charset="0"/>
+                <a:ea typeface="Helvetica Neue Medium" panose="02000503000000020004" pitchFamily="2" charset="0"/>
+                <a:cs typeface="Helvetica Neue Medium" panose="02000503000000020004" pitchFamily="2" charset="0"/>
+              </a:rPr>
+              <a:t>High trade deficits</a:t>
+            </a:r>
+          </a:p>
+        </p:txBody>
+      </p:sp>
+    </p:spTree>
+    <p:extLst>
+      <p:ext uri="{BB962C8B-B14F-4D97-AF65-F5344CB8AC3E}">
+        <p14:creationId xmlns:p14="http://schemas.microsoft.com/office/powerpoint/2010/main" val="845474794"/>
+      </p:ext>
+    </p:extLst>
+  </p:cSld>
+  <p:clrMapOvr>
+    <a:masterClrMapping/>
+  </p:clrMapOvr>
+</p:sld>
+</file>
+
+<file path=ppt/slides/slide14.xml><?xml version="1.0" encoding="utf-8"?>
+<p:sld xmlns:a="http://schemas.openxmlformats.org/drawingml/2006/main" xmlns:r="http://schemas.openxmlformats.org/officeDocument/2006/relationships" xmlns:p="http://schemas.openxmlformats.org/presentationml/2006/main">
+  <p:cSld>
+    <p:bg>
+      <p:bgPr>
+        <a:solidFill>
+          <a:schemeClr val="bg1">
+            <a:alpha val="0"/>
+          </a:schemeClr>
+        </a:solidFill>
+        <a:effectLst/>
+      </p:bgPr>
+    </p:bg>
+    <p:spTree>
+      <p:nvGrpSpPr>
+        <p:cNvPr id="1" name=""/>
+        <p:cNvGrpSpPr/>
+        <p:nvPr/>
+      </p:nvGrpSpPr>
+      <p:grpSpPr>
+        <a:xfrm>
+          <a:off x="0" y="0"/>
+          <a:ext cx="0" cy="0"/>
+          <a:chOff x="0" y="0"/>
+          <a:chExt cx="0" cy="0"/>
+        </a:xfrm>
+      </p:grpSpPr>
+      <p:sp>
+        <p:nvSpPr>
+          <p:cNvPr id="17" name="Rounded Rectangle 16">
+            <a:extLst>
+              <a:ext uri="{FF2B5EF4-FFF2-40B4-BE49-F238E27FC236}">
+                <a16:creationId xmlns:a16="http://schemas.microsoft.com/office/drawing/2014/main" id="{8E9AE9C6-EBE8-8F46-A7A2-D2E2E2C711E9}"/>
+              </a:ext>
+            </a:extLst>
+          </p:cNvPr>
+          <p:cNvSpPr/>
+          <p:nvPr/>
+        </p:nvSpPr>
+        <p:spPr>
+          <a:xfrm>
+            <a:off x="3459721" y="614234"/>
+            <a:ext cx="3206191" cy="374190"/>
+          </a:xfrm>
+          <a:prstGeom prst="roundRect">
+            <a:avLst/>
+          </a:prstGeom>
+          <a:solidFill>
+            <a:schemeClr val="bg1">
+              <a:lumMod val="85000"/>
+            </a:schemeClr>
+          </a:solidFill>
+          <a:ln>
+            <a:noFill/>
+          </a:ln>
+        </p:spPr>
+        <p:style>
+          <a:lnRef idx="2">
+            <a:schemeClr val="accent1">
+              <a:shade val="50000"/>
+            </a:schemeClr>
+          </a:lnRef>
+          <a:fillRef idx="1">
+            <a:schemeClr val="accent1"/>
+          </a:fillRef>
+          <a:effectRef idx="0">
+            <a:schemeClr val="accent1"/>
+          </a:effectRef>
+          <a:fontRef idx="minor">
+            <a:schemeClr val="lt1"/>
+          </a:fontRef>
+        </p:style>
+        <p:txBody>
+          <a:bodyPr rot="0" spcFirstLastPara="0" vertOverflow="overflow" horzOverflow="overflow" vert="horz" wrap="square" lIns="91440" tIns="45720" rIns="91440" bIns="45720" numCol="1" spcCol="0" rtlCol="0" fromWordArt="0" anchor="ctr" anchorCtr="0" forceAA="0" compatLnSpc="1">
+            <a:prstTxWarp prst="textNoShape">
+              <a:avLst/>
+            </a:prstTxWarp>
+            <a:noAutofit/>
+          </a:bodyPr>
+          <a:lstStyle/>
+          <a:p>
+            <a:pPr algn="ctr"/>
+            <a:r>
+              <a:rPr lang="en-US" sz="1800" b="1" dirty="0">
+                <a:solidFill>
+                  <a:schemeClr val="tx1"/>
+                </a:solidFill>
+                <a:latin typeface="Helvetica" pitchFamily="2" charset="0"/>
+                <a:ea typeface="Helvetica Neue Medium" panose="02000503000000020004" pitchFamily="2" charset="0"/>
+                <a:cs typeface="Helvetica Neue Medium" panose="02000503000000020004" pitchFamily="2" charset="0"/>
+              </a:rPr>
+              <a:t>Low trade deficits</a:t>
+            </a:r>
+          </a:p>
+        </p:txBody>
+      </p:sp>
+    </p:spTree>
+    <p:extLst>
+      <p:ext uri="{BB962C8B-B14F-4D97-AF65-F5344CB8AC3E}">
+        <p14:creationId xmlns:p14="http://schemas.microsoft.com/office/powerpoint/2010/main" val="1210712810"/>
+      </p:ext>
+    </p:extLst>
+  </p:cSld>
+  <p:clrMapOvr>
+    <a:masterClrMapping/>
+  </p:clrMapOvr>
+</p:sld>
+</file>
+
+<file path=ppt/slides/slide15.xml><?xml version="1.0" encoding="utf-8"?>
+<p:sld xmlns:a="http://schemas.openxmlformats.org/drawingml/2006/main" xmlns:r="http://schemas.openxmlformats.org/officeDocument/2006/relationships" xmlns:p="http://schemas.openxmlformats.org/presentationml/2006/main">
+  <p:cSld>
+    <p:bg>
+      <p:bgPr>
+        <a:solidFill>
+          <a:schemeClr val="bg1">
+            <a:alpha val="0"/>
+          </a:schemeClr>
+        </a:solidFill>
+        <a:effectLst/>
+      </p:bgPr>
+    </p:bg>
+    <p:spTree>
+      <p:nvGrpSpPr>
+        <p:cNvPr id="1" name=""/>
+        <p:cNvGrpSpPr/>
+        <p:nvPr/>
+      </p:nvGrpSpPr>
+      <p:grpSpPr>
+        <a:xfrm>
+          <a:off x="0" y="0"/>
+          <a:ext cx="0" cy="0"/>
+          <a:chOff x="0" y="0"/>
+          <a:chExt cx="0" cy="0"/>
+        </a:xfrm>
+      </p:grpSpPr>
+      <p:sp>
+        <p:nvSpPr>
+          <p:cNvPr id="17" name="Rounded Rectangle 16">
+            <a:extLst>
+              <a:ext uri="{FF2B5EF4-FFF2-40B4-BE49-F238E27FC236}">
+                <a16:creationId xmlns:a16="http://schemas.microsoft.com/office/drawing/2014/main" id="{8E9AE9C6-EBE8-8F46-A7A2-D2E2E2C711E9}"/>
+              </a:ext>
+            </a:extLst>
+          </p:cNvPr>
+          <p:cNvSpPr/>
+          <p:nvPr/>
+        </p:nvSpPr>
+        <p:spPr>
+          <a:xfrm>
+            <a:off x="3459721" y="614234"/>
+            <a:ext cx="3206191" cy="374190"/>
+          </a:xfrm>
+          <a:prstGeom prst="roundRect">
+            <a:avLst/>
+          </a:prstGeom>
+          <a:solidFill>
+            <a:schemeClr val="bg1">
+              <a:lumMod val="85000"/>
+            </a:schemeClr>
+          </a:solidFill>
+          <a:ln>
+            <a:noFill/>
+          </a:ln>
+        </p:spPr>
+        <p:style>
+          <a:lnRef idx="2">
+            <a:schemeClr val="accent1">
+              <a:shade val="50000"/>
+            </a:schemeClr>
+          </a:lnRef>
+          <a:fillRef idx="1">
+            <a:schemeClr val="accent1"/>
+          </a:fillRef>
+          <a:effectRef idx="0">
+            <a:schemeClr val="accent1"/>
+          </a:effectRef>
+          <a:fontRef idx="minor">
+            <a:schemeClr val="lt1"/>
+          </a:fontRef>
+        </p:style>
+        <p:txBody>
+          <a:bodyPr rot="0" spcFirstLastPara="0" vertOverflow="overflow" horzOverflow="overflow" vert="horz" wrap="square" lIns="91440" tIns="45720" rIns="91440" bIns="45720" numCol="1" spcCol="0" rtlCol="0" fromWordArt="0" anchor="ctr" anchorCtr="0" forceAA="0" compatLnSpc="1">
+            <a:prstTxWarp prst="textNoShape">
+              <a:avLst/>
+            </a:prstTxWarp>
+            <a:noAutofit/>
+          </a:bodyPr>
+          <a:lstStyle/>
+          <a:p>
+            <a:pPr algn="ctr"/>
+            <a:r>
+              <a:rPr lang="en-US" sz="1800" b="1" dirty="0">
+                <a:solidFill>
+                  <a:schemeClr val="tx1"/>
+                </a:solidFill>
+                <a:latin typeface="Helvetica" pitchFamily="2" charset="0"/>
+                <a:ea typeface="Helvetica Neue Medium" panose="02000503000000020004" pitchFamily="2" charset="0"/>
+                <a:cs typeface="Helvetica Neue Medium" panose="02000503000000020004" pitchFamily="2" charset="0"/>
+              </a:rPr>
+              <a:t>Normal trade deficits</a:t>
+            </a:r>
+          </a:p>
+        </p:txBody>
+      </p:sp>
+    </p:spTree>
+    <p:extLst>
+      <p:ext uri="{BB962C8B-B14F-4D97-AF65-F5344CB8AC3E}">
+        <p14:creationId xmlns:p14="http://schemas.microsoft.com/office/powerpoint/2010/main" val="2184913176"/>
+      </p:ext>
+    </p:extLst>
+  </p:cSld>
+  <p:clrMapOvr>
+    <a:masterClrMapping/>
+  </p:clrMapOvr>
+</p:sld>
+</file>
+
+<file path=ppt/slides/slide16.xml><?xml version="1.0" encoding="utf-8"?>
+<p:sld xmlns:a="http://schemas.openxmlformats.org/drawingml/2006/main" xmlns:r="http://schemas.openxmlformats.org/officeDocument/2006/relationships" xmlns:p="http://schemas.openxmlformats.org/presentationml/2006/main">
+  <p:cSld>
+    <p:bg>
+      <p:bgPr>
+        <a:solidFill>
+          <a:schemeClr val="bg1">
+            <a:alpha val="0"/>
+          </a:schemeClr>
+        </a:solidFill>
+        <a:effectLst/>
+      </p:bgPr>
+    </p:bg>
+    <p:spTree>
+      <p:nvGrpSpPr>
+        <p:cNvPr id="1" name=""/>
+        <p:cNvGrpSpPr/>
+        <p:nvPr/>
+      </p:nvGrpSpPr>
+      <p:grpSpPr>
+        <a:xfrm>
+          <a:off x="0" y="0"/>
+          <a:ext cx="0" cy="0"/>
+          <a:chOff x="0" y="0"/>
+          <a:chExt cx="0" cy="0"/>
+        </a:xfrm>
+      </p:grpSpPr>
+      <p:sp>
+        <p:nvSpPr>
+          <p:cNvPr id="17" name="Rounded Rectangle 16">
+            <a:extLst>
+              <a:ext uri="{FF2B5EF4-FFF2-40B4-BE49-F238E27FC236}">
+                <a16:creationId xmlns:a16="http://schemas.microsoft.com/office/drawing/2014/main" id="{8E9AE9C6-EBE8-8F46-A7A2-D2E2E2C711E9}"/>
+              </a:ext>
+            </a:extLst>
+          </p:cNvPr>
+          <p:cNvSpPr/>
+          <p:nvPr/>
+        </p:nvSpPr>
+        <p:spPr>
+          <a:xfrm>
+            <a:off x="3459721" y="614234"/>
+            <a:ext cx="3206191" cy="374190"/>
+          </a:xfrm>
+          <a:prstGeom prst="roundRect">
+            <a:avLst/>
+          </a:prstGeom>
+          <a:solidFill>
+            <a:schemeClr val="bg1">
+              <a:lumMod val="85000"/>
+            </a:schemeClr>
+          </a:solidFill>
+          <a:ln>
+            <a:noFill/>
+          </a:ln>
+        </p:spPr>
+        <p:style>
+          <a:lnRef idx="2">
+            <a:schemeClr val="accent1">
+              <a:shade val="50000"/>
+            </a:schemeClr>
+          </a:lnRef>
+          <a:fillRef idx="1">
+            <a:schemeClr val="accent1"/>
+          </a:fillRef>
+          <a:effectRef idx="0">
+            <a:schemeClr val="accent1"/>
+          </a:effectRef>
+          <a:fontRef idx="minor">
+            <a:schemeClr val="lt1"/>
+          </a:fontRef>
+        </p:style>
+        <p:txBody>
+          <a:bodyPr rot="0" spcFirstLastPara="0" vertOverflow="overflow" horzOverflow="overflow" vert="horz" wrap="square" lIns="91440" tIns="45720" rIns="91440" bIns="45720" numCol="1" spcCol="0" rtlCol="0" fromWordArt="0" anchor="ctr" anchorCtr="0" forceAA="0" compatLnSpc="1">
+            <a:prstTxWarp prst="textNoShape">
+              <a:avLst/>
+            </a:prstTxWarp>
+            <a:noAutofit/>
+          </a:bodyPr>
+          <a:lstStyle/>
+          <a:p>
+            <a:pPr algn="ctr"/>
+            <a:r>
+              <a:rPr lang="en-US" sz="1800" b="1" dirty="0">
+                <a:solidFill>
+                  <a:schemeClr val="tx1"/>
+                </a:solidFill>
+                <a:latin typeface="Helvetica" pitchFamily="2" charset="0"/>
+                <a:ea typeface="Helvetica Neue Medium" panose="02000503000000020004" pitchFamily="2" charset="0"/>
+                <a:cs typeface="Helvetica Neue Medium" panose="02000503000000020004" pitchFamily="2" charset="0"/>
+              </a:rPr>
+              <a:t>???</a:t>
+            </a:r>
+          </a:p>
+        </p:txBody>
+      </p:sp>
+    </p:spTree>
+    <p:extLst>
+      <p:ext uri="{BB962C8B-B14F-4D97-AF65-F5344CB8AC3E}">
+        <p14:creationId xmlns:p14="http://schemas.microsoft.com/office/powerpoint/2010/main" val="2937526981"/>
+      </p:ext>
+    </p:extLst>
+  </p:cSld>
+  <p:clrMapOvr>
+    <a:masterClrMapping/>
+  </p:clrMapOvr>
+</p:sld>
+</file>
+
+<file path=ppt/slides/slide17.xml><?xml version="1.0" encoding="utf-8"?>
+<p:sld xmlns:a="http://schemas.openxmlformats.org/drawingml/2006/main" xmlns:r="http://schemas.openxmlformats.org/officeDocument/2006/relationships" xmlns:p="http://schemas.openxmlformats.org/presentationml/2006/main">
+  <p:cSld>
+    <p:bg>
+      <p:bgPr>
+        <a:solidFill>
+          <a:schemeClr val="bg1">
+            <a:alpha val="0"/>
+          </a:schemeClr>
+        </a:solidFill>
+        <a:effectLst/>
+      </p:bgPr>
+    </p:bg>
+    <p:spTree>
+      <p:nvGrpSpPr>
+        <p:cNvPr id="1" name=""/>
+        <p:cNvGrpSpPr/>
+        <p:nvPr/>
+      </p:nvGrpSpPr>
+      <p:grpSpPr>
+        <a:xfrm>
+          <a:off x="0" y="0"/>
+          <a:ext cx="0" cy="0"/>
+          <a:chOff x="0" y="0"/>
+          <a:chExt cx="0" cy="0"/>
+        </a:xfrm>
+      </p:grpSpPr>
+      <p:sp>
+        <p:nvSpPr>
+          <p:cNvPr id="17" name="Rounded Rectangle 16">
+            <a:extLst>
+              <a:ext uri="{FF2B5EF4-FFF2-40B4-BE49-F238E27FC236}">
+                <a16:creationId xmlns:a16="http://schemas.microsoft.com/office/drawing/2014/main" id="{8E9AE9C6-EBE8-8F46-A7A2-D2E2E2C711E9}"/>
+              </a:ext>
+            </a:extLst>
+          </p:cNvPr>
+          <p:cNvSpPr/>
+          <p:nvPr/>
+        </p:nvSpPr>
+        <p:spPr>
+          <a:xfrm>
+            <a:off x="3459721" y="614234"/>
+            <a:ext cx="3206191" cy="374190"/>
+          </a:xfrm>
+          <a:prstGeom prst="roundRect">
+            <a:avLst/>
+          </a:prstGeom>
+          <a:solidFill>
+            <a:schemeClr val="bg1">
+              <a:lumMod val="85000"/>
+            </a:schemeClr>
+          </a:solidFill>
+          <a:ln>
+            <a:noFill/>
+          </a:ln>
+        </p:spPr>
+        <p:style>
+          <a:lnRef idx="2">
+            <a:schemeClr val="accent1">
+              <a:shade val="50000"/>
+            </a:schemeClr>
+          </a:lnRef>
+          <a:fillRef idx="1">
+            <a:schemeClr val="accent1"/>
+          </a:fillRef>
+          <a:effectRef idx="0">
+            <a:schemeClr val="accent1"/>
+          </a:effectRef>
+          <a:fontRef idx="minor">
+            <a:schemeClr val="lt1"/>
+          </a:fontRef>
+        </p:style>
+        <p:txBody>
+          <a:bodyPr rot="0" spcFirstLastPara="0" vertOverflow="overflow" horzOverflow="overflow" vert="horz" wrap="square" lIns="91440" tIns="45720" rIns="91440" bIns="45720" numCol="1" spcCol="0" rtlCol="0" fromWordArt="0" anchor="ctr" anchorCtr="0" forceAA="0" compatLnSpc="1">
+            <a:prstTxWarp prst="textNoShape">
+              <a:avLst/>
+            </a:prstTxWarp>
+            <a:noAutofit/>
+          </a:bodyPr>
+          <a:lstStyle/>
+          <a:p>
+            <a:pPr algn="ctr"/>
+            <a:r>
+              <a:rPr lang="en-US" sz="1800" b="1" dirty="0">
+                <a:solidFill>
+                  <a:schemeClr val="tx1"/>
+                </a:solidFill>
+                <a:latin typeface="Helvetica" pitchFamily="2" charset="0"/>
+                <a:ea typeface="Helvetica Neue Medium" panose="02000503000000020004" pitchFamily="2" charset="0"/>
+                <a:cs typeface="Helvetica Neue Medium" panose="02000503000000020004" pitchFamily="2" charset="0"/>
+              </a:rPr>
+              <a:t>_____</a:t>
+            </a:r>
+          </a:p>
+        </p:txBody>
+      </p:sp>
+    </p:spTree>
+    <p:extLst>
+      <p:ext uri="{BB962C8B-B14F-4D97-AF65-F5344CB8AC3E}">
+        <p14:creationId xmlns:p14="http://schemas.microsoft.com/office/powerpoint/2010/main" val="117620960"/>
+      </p:ext>
+    </p:extLst>
+  </p:cSld>
+  <p:clrMapOvr>
+    <a:masterClrMapping/>
+  </p:clrMapOvr>
+</p:sld>
+</file>
+
+<file path=ppt/slides/slide2.xml><?xml version="1.0" encoding="utf-8"?>
+<p:sld xmlns:a="http://schemas.openxmlformats.org/drawingml/2006/main" xmlns:r="http://schemas.openxmlformats.org/officeDocument/2006/relationships" xmlns:p="http://schemas.openxmlformats.org/presentationml/2006/main">
+  <p:cSld>
+    <p:bg>
+      <p:bgPr>
+        <a:solidFill>
+          <a:schemeClr val="bg1">
+            <a:alpha val="0"/>
+          </a:schemeClr>
+        </a:solidFill>
+        <a:effectLst/>
+      </p:bgPr>
+    </p:bg>
+    <p:spTree>
+      <p:nvGrpSpPr>
+        <p:cNvPr id="1" name=""/>
+        <p:cNvGrpSpPr/>
+        <p:nvPr/>
+      </p:nvGrpSpPr>
+      <p:grpSpPr>
+        <a:xfrm>
+          <a:off x="0" y="0"/>
+          <a:ext cx="0" cy="0"/>
+          <a:chOff x="0" y="0"/>
+          <a:chExt cx="0" cy="0"/>
+        </a:xfrm>
+      </p:grpSpPr>
       <p:cxnSp>
         <p:nvCxnSpPr>
           <p:cNvPr id="10" name="Straight Arrow Connector 9">
@@ -3538,8 +4265,6 @@
           </p:cNvPr>
           <p:cNvCxnSpPr>
             <a:cxnSpLocks/>
-            <a:stCxn id="8" idx="3"/>
-            <a:endCxn id="6" idx="1"/>
           </p:cNvCxnSpPr>
           <p:nvPr/>
         </p:nvCxnSpPr>
@@ -3587,8 +4312,6 @@
           </p:cNvPr>
           <p:cNvCxnSpPr>
             <a:cxnSpLocks/>
-            <a:stCxn id="8" idx="3"/>
-            <a:endCxn id="17" idx="1"/>
           </p:cNvCxnSpPr>
           <p:nvPr/>
         </p:nvCxnSpPr>
@@ -3625,12 +4348,52 @@
           </a:fontRef>
         </p:style>
       </p:cxnSp>
-      <p:sp>
-        <p:nvSpPr>
-          <p:cNvPr id="2" name="Rectangle 1">
+    </p:spTree>
+    <p:extLst>
+      <p:ext uri="{BB962C8B-B14F-4D97-AF65-F5344CB8AC3E}">
+        <p14:creationId xmlns:p14="http://schemas.microsoft.com/office/powerpoint/2010/main" val="2686877411"/>
+      </p:ext>
+    </p:extLst>
+  </p:cSld>
+  <p:clrMapOvr>
+    <a:masterClrMapping/>
+  </p:clrMapOvr>
+</p:sld>
+</file>
+
+<file path=ppt/slides/slide3.xml><?xml version="1.0" encoding="utf-8"?>
+<p:sld xmlns:a="http://schemas.openxmlformats.org/drawingml/2006/main" xmlns:r="http://schemas.openxmlformats.org/officeDocument/2006/relationships" xmlns:p="http://schemas.openxmlformats.org/presentationml/2006/main" showMasterSp="0">
+  <p:cSld>
+    <p:bg>
+      <p:bgPr>
+        <a:solidFill>
+          <a:schemeClr val="bg1">
+            <a:alpha val="0"/>
+          </a:schemeClr>
+        </a:solidFill>
+        <a:effectLst/>
+      </p:bgPr>
+    </p:bg>
+    <p:spTree>
+      <p:nvGrpSpPr>
+        <p:cNvPr id="1" name=""/>
+        <p:cNvGrpSpPr/>
+        <p:nvPr/>
+      </p:nvGrpSpPr>
+      <p:grpSpPr>
+        <a:xfrm>
+          <a:off x="0" y="0"/>
+          <a:ext cx="0" cy="0"/>
+          <a:chOff x="0" y="0"/>
+          <a:chExt cx="0" cy="0"/>
+        </a:xfrm>
+      </p:grpSpPr>
+      <p:sp>
+        <p:nvSpPr>
+          <p:cNvPr id="8" name="Rounded Rectangle 7">
             <a:extLst>
               <a:ext uri="{FF2B5EF4-FFF2-40B4-BE49-F238E27FC236}">
-                <a16:creationId xmlns:a16="http://schemas.microsoft.com/office/drawing/2014/main" id="{6BB7B98B-8354-774D-B024-5F9DA80FF45E}"/>
+                <a16:creationId xmlns:a16="http://schemas.microsoft.com/office/drawing/2014/main" id="{113C0142-E6EA-5A45-934A-7819FD86E179}"/>
               </a:ext>
             </a:extLst>
           </p:cNvPr>
@@ -3639,47 +4402,8 @@
         </p:nvSpPr>
         <p:spPr>
           <a:xfrm>
-            <a:off x="2746078" y="63654"/>
-            <a:ext cx="490840" cy="276999"/>
-          </a:xfrm>
-          <a:prstGeom prst="rect">
-            <a:avLst/>
-          </a:prstGeom>
-        </p:spPr>
-        <p:txBody>
-          <a:bodyPr wrap="none">
-            <a:spAutoFit/>
-          </a:bodyPr>
-          <a:lstStyle/>
-          <a:p>
-            <a:r>
-              <a:rPr lang="en-US" sz="1200" b="1" dirty="0">
-                <a:latin typeface="Helvetica" pitchFamily="2" charset="0"/>
-                <a:ea typeface="Helvetica Neue Medium" panose="02000503000000020004" pitchFamily="2" charset="0"/>
-                <a:cs typeface="Helvetica Neue Medium" panose="02000503000000020004" pitchFamily="2" charset="0"/>
-              </a:rPr>
-              <a:t>75%</a:t>
-            </a:r>
-            <a:endParaRPr lang="en-US" sz="1200" dirty="0"/>
-          </a:p>
-        </p:txBody>
-      </p:sp>
-      <p:sp>
-        <p:nvSpPr>
-          <p:cNvPr id="17" name="Rounded Rectangle 16">
-            <a:extLst>
-              <a:ext uri="{FF2B5EF4-FFF2-40B4-BE49-F238E27FC236}">
-                <a16:creationId xmlns:a16="http://schemas.microsoft.com/office/drawing/2014/main" id="{8E9AE9C6-EBE8-8F46-A7A2-D2E2E2C711E9}"/>
-              </a:ext>
-            </a:extLst>
-          </p:cNvPr>
-          <p:cNvSpPr/>
-          <p:nvPr/>
-        </p:nvSpPr>
-        <p:spPr>
-          <a:xfrm>
-            <a:off x="3459721" y="614234"/>
-            <a:ext cx="3206191" cy="374190"/>
+            <a:off x="-1924" y="299243"/>
+            <a:ext cx="2560932" cy="389938"/>
           </a:xfrm>
           <a:prstGeom prst="roundRect">
             <a:avLst/>
@@ -3728,54 +4452,15 @@
                 <a:ea typeface="Helvetica Neue Medium" panose="02000503000000020004" pitchFamily="2" charset="0"/>
                 <a:cs typeface="Helvetica Neue Medium" panose="02000503000000020004" pitchFamily="2" charset="0"/>
               </a:rPr>
-              <a:t>Low trade deficits</a:t>
-            </a:r>
-          </a:p>
-        </p:txBody>
-      </p:sp>
-      <p:sp>
-        <p:nvSpPr>
-          <p:cNvPr id="22" name="Rectangle 21">
-            <a:extLst>
-              <a:ext uri="{FF2B5EF4-FFF2-40B4-BE49-F238E27FC236}">
-                <a16:creationId xmlns:a16="http://schemas.microsoft.com/office/drawing/2014/main" id="{6CD4E334-CEF6-5C44-8007-A04C5004FDF5}"/>
-              </a:ext>
-            </a:extLst>
-          </p:cNvPr>
-          <p:cNvSpPr/>
-          <p:nvPr/>
-        </p:nvSpPr>
-        <p:spPr>
-          <a:xfrm>
-            <a:off x="2763944" y="654505"/>
-            <a:ext cx="490840" cy="276999"/>
-          </a:xfrm>
-          <a:prstGeom prst="rect">
-            <a:avLst/>
-          </a:prstGeom>
-        </p:spPr>
-        <p:txBody>
-          <a:bodyPr wrap="none">
-            <a:spAutoFit/>
-          </a:bodyPr>
-          <a:lstStyle/>
-          <a:p>
-            <a:r>
-              <a:rPr lang="en-US" sz="1200" b="1" dirty="0">
-                <a:latin typeface="Helvetica" pitchFamily="2" charset="0"/>
-                <a:ea typeface="Helvetica Neue Medium" panose="02000503000000020004" pitchFamily="2" charset="0"/>
-                <a:cs typeface="Helvetica Neue Medium" panose="02000503000000020004" pitchFamily="2" charset="0"/>
-              </a:rPr>
-              <a:t>75%</a:t>
-            </a:r>
-            <a:endParaRPr lang="en-US" sz="1200" dirty="0"/>
+              <a:t>High interest rates</a:t>
+            </a:r>
           </a:p>
         </p:txBody>
       </p:sp>
     </p:spTree>
     <p:extLst>
       <p:ext uri="{BB962C8B-B14F-4D97-AF65-F5344CB8AC3E}">
-        <p14:creationId xmlns:p14="http://schemas.microsoft.com/office/powerpoint/2010/main" val="1210712810"/>
+        <p14:creationId xmlns:p14="http://schemas.microsoft.com/office/powerpoint/2010/main" val="3274314287"/>
       </p:ext>
     </p:extLst>
   </p:cSld>
@@ -3785,7 +4470,413 @@
 </p:sld>
 </file>
 
-<file path=ppt/slides/slide3.xml><?xml version="1.0" encoding="utf-8"?>
+<file path=ppt/slides/slide4.xml><?xml version="1.0" encoding="utf-8"?>
+<p:sld xmlns:a="http://schemas.openxmlformats.org/drawingml/2006/main" xmlns:r="http://schemas.openxmlformats.org/officeDocument/2006/relationships" xmlns:p="http://schemas.openxmlformats.org/presentationml/2006/main" showMasterSp="0">
+  <p:cSld>
+    <p:bg>
+      <p:bgPr>
+        <a:solidFill>
+          <a:schemeClr val="bg1">
+            <a:alpha val="0"/>
+          </a:schemeClr>
+        </a:solidFill>
+        <a:effectLst/>
+      </p:bgPr>
+    </p:bg>
+    <p:spTree>
+      <p:nvGrpSpPr>
+        <p:cNvPr id="1" name=""/>
+        <p:cNvGrpSpPr/>
+        <p:nvPr/>
+      </p:nvGrpSpPr>
+      <p:grpSpPr>
+        <a:xfrm>
+          <a:off x="0" y="0"/>
+          <a:ext cx="0" cy="0"/>
+          <a:chOff x="0" y="0"/>
+          <a:chExt cx="0" cy="0"/>
+        </a:xfrm>
+      </p:grpSpPr>
+      <p:sp>
+        <p:nvSpPr>
+          <p:cNvPr id="8" name="Rounded Rectangle 7">
+            <a:extLst>
+              <a:ext uri="{FF2B5EF4-FFF2-40B4-BE49-F238E27FC236}">
+                <a16:creationId xmlns:a16="http://schemas.microsoft.com/office/drawing/2014/main" id="{113C0142-E6EA-5A45-934A-7819FD86E179}"/>
+              </a:ext>
+            </a:extLst>
+          </p:cNvPr>
+          <p:cNvSpPr/>
+          <p:nvPr/>
+        </p:nvSpPr>
+        <p:spPr>
+          <a:xfrm>
+            <a:off x="-1924" y="299243"/>
+            <a:ext cx="2560932" cy="389938"/>
+          </a:xfrm>
+          <a:prstGeom prst="roundRect">
+            <a:avLst/>
+          </a:prstGeom>
+          <a:solidFill>
+            <a:schemeClr val="bg1">
+              <a:lumMod val="85000"/>
+            </a:schemeClr>
+          </a:solidFill>
+          <a:ln>
+            <a:noFill/>
+          </a:ln>
+        </p:spPr>
+        <p:style>
+          <a:lnRef idx="2">
+            <a:schemeClr val="accent1">
+              <a:shade val="50000"/>
+            </a:schemeClr>
+          </a:lnRef>
+          <a:fillRef idx="1">
+            <a:schemeClr val="accent1"/>
+          </a:fillRef>
+          <a:effectRef idx="0">
+            <a:schemeClr val="accent1"/>
+          </a:effectRef>
+          <a:fontRef idx="minor">
+            <a:schemeClr val="lt1"/>
+          </a:fontRef>
+        </p:style>
+        <p:txBody>
+          <a:bodyPr rot="0" spcFirstLastPara="0" vertOverflow="overflow" horzOverflow="overflow" vert="horz" wrap="square" lIns="91440" tIns="45720" rIns="91440" bIns="45720" numCol="1" spcCol="0" rtlCol="0" fromWordArt="0" anchor="ctr" anchorCtr="0" forceAA="0" compatLnSpc="1">
+            <a:prstTxWarp prst="textNoShape">
+              <a:avLst/>
+            </a:prstTxWarp>
+            <a:noAutofit/>
+          </a:bodyPr>
+          <a:lstStyle/>
+          <a:p>
+            <a:pPr algn="ctr"/>
+            <a:r>
+              <a:rPr lang="en-US" sz="1800" b="1" dirty="0">
+                <a:solidFill>
+                  <a:schemeClr val="tx1"/>
+                </a:solidFill>
+                <a:latin typeface="Helvetica" pitchFamily="2" charset="0"/>
+                <a:ea typeface="Helvetica Neue Medium" panose="02000503000000020004" pitchFamily="2" charset="0"/>
+                <a:cs typeface="Helvetica Neue Medium" panose="02000503000000020004" pitchFamily="2" charset="0"/>
+              </a:rPr>
+              <a:t>Low interest rates</a:t>
+            </a:r>
+          </a:p>
+        </p:txBody>
+      </p:sp>
+    </p:spTree>
+    <p:extLst>
+      <p:ext uri="{BB962C8B-B14F-4D97-AF65-F5344CB8AC3E}">
+        <p14:creationId xmlns:p14="http://schemas.microsoft.com/office/powerpoint/2010/main" val="2450906826"/>
+      </p:ext>
+    </p:extLst>
+  </p:cSld>
+  <p:clrMapOvr>
+    <a:masterClrMapping/>
+  </p:clrMapOvr>
+</p:sld>
+</file>
+
+<file path=ppt/slides/slide5.xml><?xml version="1.0" encoding="utf-8"?>
+<p:sld xmlns:a="http://schemas.openxmlformats.org/drawingml/2006/main" xmlns:r="http://schemas.openxmlformats.org/officeDocument/2006/relationships" xmlns:p="http://schemas.openxmlformats.org/presentationml/2006/main">
+  <p:cSld>
+    <p:spTree>
+      <p:nvGrpSpPr>
+        <p:cNvPr id="1" name=""/>
+        <p:cNvGrpSpPr/>
+        <p:nvPr/>
+      </p:nvGrpSpPr>
+      <p:grpSpPr>
+        <a:xfrm>
+          <a:off x="0" y="0"/>
+          <a:ext cx="0" cy="0"/>
+          <a:chOff x="0" y="0"/>
+          <a:chExt cx="0" cy="0"/>
+        </a:xfrm>
+      </p:grpSpPr>
+      <p:sp>
+        <p:nvSpPr>
+          <p:cNvPr id="8" name="Rounded Rectangle 7">
+            <a:extLst>
+              <a:ext uri="{FF2B5EF4-FFF2-40B4-BE49-F238E27FC236}">
+                <a16:creationId xmlns:a16="http://schemas.microsoft.com/office/drawing/2014/main" id="{113C0142-E6EA-5A45-934A-7819FD86E179}"/>
+              </a:ext>
+            </a:extLst>
+          </p:cNvPr>
+          <p:cNvSpPr/>
+          <p:nvPr/>
+        </p:nvSpPr>
+        <p:spPr>
+          <a:xfrm>
+            <a:off x="-1924" y="299243"/>
+            <a:ext cx="2560932" cy="389938"/>
+          </a:xfrm>
+          <a:prstGeom prst="roundRect">
+            <a:avLst/>
+          </a:prstGeom>
+          <a:solidFill>
+            <a:schemeClr val="bg1">
+              <a:lumMod val="85000"/>
+            </a:schemeClr>
+          </a:solidFill>
+          <a:ln>
+            <a:noFill/>
+          </a:ln>
+        </p:spPr>
+        <p:style>
+          <a:lnRef idx="2">
+            <a:schemeClr val="accent1">
+              <a:shade val="50000"/>
+            </a:schemeClr>
+          </a:lnRef>
+          <a:fillRef idx="1">
+            <a:schemeClr val="accent1"/>
+          </a:fillRef>
+          <a:effectRef idx="0">
+            <a:schemeClr val="accent1"/>
+          </a:effectRef>
+          <a:fontRef idx="minor">
+            <a:schemeClr val="lt1"/>
+          </a:fontRef>
+        </p:style>
+        <p:txBody>
+          <a:bodyPr rot="0" spcFirstLastPara="0" vertOverflow="overflow" horzOverflow="overflow" vert="horz" wrap="square" lIns="91440" tIns="45720" rIns="91440" bIns="45720" numCol="1" spcCol="0" rtlCol="0" fromWordArt="0" anchor="ctr" anchorCtr="0" forceAA="0" compatLnSpc="1">
+            <a:prstTxWarp prst="textNoShape">
+              <a:avLst/>
+            </a:prstTxWarp>
+            <a:noAutofit/>
+          </a:bodyPr>
+          <a:lstStyle/>
+          <a:p>
+            <a:pPr algn="ctr"/>
+            <a:r>
+              <a:rPr lang="en-US" sz="1800" b="1" dirty="0">
+                <a:solidFill>
+                  <a:schemeClr val="tx1"/>
+                </a:solidFill>
+                <a:latin typeface="Helvetica" pitchFamily="2" charset="0"/>
+                <a:ea typeface="Helvetica Neue Medium" panose="02000503000000020004" pitchFamily="2" charset="0"/>
+                <a:cs typeface="Helvetica Neue Medium" panose="02000503000000020004" pitchFamily="2" charset="0"/>
+              </a:rPr>
+              <a:t>Normal interest rates</a:t>
+            </a:r>
+          </a:p>
+        </p:txBody>
+      </p:sp>
+    </p:spTree>
+    <p:extLst>
+      <p:ext uri="{BB962C8B-B14F-4D97-AF65-F5344CB8AC3E}">
+        <p14:creationId xmlns:p14="http://schemas.microsoft.com/office/powerpoint/2010/main" val="3501553405"/>
+      </p:ext>
+    </p:extLst>
+  </p:cSld>
+  <p:clrMapOvr>
+    <a:masterClrMapping/>
+  </p:clrMapOvr>
+</p:sld>
+</file>
+
+<file path=ppt/slides/slide6.xml><?xml version="1.0" encoding="utf-8"?>
+<p:sld xmlns:a="http://schemas.openxmlformats.org/drawingml/2006/main" xmlns:r="http://schemas.openxmlformats.org/officeDocument/2006/relationships" xmlns:p="http://schemas.openxmlformats.org/presentationml/2006/main">
+  <p:cSld>
+    <p:spTree>
+      <p:nvGrpSpPr>
+        <p:cNvPr id="1" name=""/>
+        <p:cNvGrpSpPr/>
+        <p:nvPr/>
+      </p:nvGrpSpPr>
+      <p:grpSpPr>
+        <a:xfrm>
+          <a:off x="0" y="0"/>
+          <a:ext cx="0" cy="0"/>
+          <a:chOff x="0" y="0"/>
+          <a:chExt cx="0" cy="0"/>
+        </a:xfrm>
+      </p:grpSpPr>
+      <p:sp>
+        <p:nvSpPr>
+          <p:cNvPr id="8" name="Rounded Rectangle 7">
+            <a:extLst>
+              <a:ext uri="{FF2B5EF4-FFF2-40B4-BE49-F238E27FC236}">
+                <a16:creationId xmlns:a16="http://schemas.microsoft.com/office/drawing/2014/main" id="{113C0142-E6EA-5A45-934A-7819FD86E179}"/>
+              </a:ext>
+            </a:extLst>
+          </p:cNvPr>
+          <p:cNvSpPr/>
+          <p:nvPr/>
+        </p:nvSpPr>
+        <p:spPr>
+          <a:xfrm>
+            <a:off x="-1924" y="299243"/>
+            <a:ext cx="2560932" cy="389938"/>
+          </a:xfrm>
+          <a:prstGeom prst="roundRect">
+            <a:avLst/>
+          </a:prstGeom>
+          <a:solidFill>
+            <a:schemeClr val="bg1">
+              <a:lumMod val="85000"/>
+            </a:schemeClr>
+          </a:solidFill>
+          <a:ln>
+            <a:noFill/>
+          </a:ln>
+        </p:spPr>
+        <p:style>
+          <a:lnRef idx="2">
+            <a:schemeClr val="accent1">
+              <a:shade val="50000"/>
+            </a:schemeClr>
+          </a:lnRef>
+          <a:fillRef idx="1">
+            <a:schemeClr val="accent1"/>
+          </a:fillRef>
+          <a:effectRef idx="0">
+            <a:schemeClr val="accent1"/>
+          </a:effectRef>
+          <a:fontRef idx="minor">
+            <a:schemeClr val="lt1"/>
+          </a:fontRef>
+        </p:style>
+        <p:txBody>
+          <a:bodyPr rot="0" spcFirstLastPara="0" vertOverflow="overflow" horzOverflow="overflow" vert="horz" wrap="square" lIns="91440" tIns="45720" rIns="91440" bIns="45720" numCol="1" spcCol="0" rtlCol="0" fromWordArt="0" anchor="ctr" anchorCtr="0" forceAA="0" compatLnSpc="1">
+            <a:prstTxWarp prst="textNoShape">
+              <a:avLst/>
+            </a:prstTxWarp>
+            <a:noAutofit/>
+          </a:bodyPr>
+          <a:lstStyle/>
+          <a:p>
+            <a:pPr algn="ctr"/>
+            <a:r>
+              <a:rPr lang="en-US" sz="1800" b="1" dirty="0">
+                <a:solidFill>
+                  <a:schemeClr val="tx1"/>
+                </a:solidFill>
+                <a:latin typeface="Helvetica" pitchFamily="2" charset="0"/>
+                <a:ea typeface="Helvetica Neue Medium" panose="02000503000000020004" pitchFamily="2" charset="0"/>
+                <a:cs typeface="Helvetica Neue Medium" panose="02000503000000020004" pitchFamily="2" charset="0"/>
+              </a:rPr>
+              <a:t>???</a:t>
+            </a:r>
+          </a:p>
+        </p:txBody>
+      </p:sp>
+    </p:spTree>
+    <p:extLst>
+      <p:ext uri="{BB962C8B-B14F-4D97-AF65-F5344CB8AC3E}">
+        <p14:creationId xmlns:p14="http://schemas.microsoft.com/office/powerpoint/2010/main" val="3044845224"/>
+      </p:ext>
+    </p:extLst>
+  </p:cSld>
+  <p:clrMapOvr>
+    <a:masterClrMapping/>
+  </p:clrMapOvr>
+</p:sld>
+</file>
+
+<file path=ppt/slides/slide7.xml><?xml version="1.0" encoding="utf-8"?>
+<p:sld xmlns:a="http://schemas.openxmlformats.org/drawingml/2006/main" xmlns:r="http://schemas.openxmlformats.org/officeDocument/2006/relationships" xmlns:p="http://schemas.openxmlformats.org/presentationml/2006/main">
+  <p:cSld>
+    <p:spTree>
+      <p:nvGrpSpPr>
+        <p:cNvPr id="1" name=""/>
+        <p:cNvGrpSpPr/>
+        <p:nvPr/>
+      </p:nvGrpSpPr>
+      <p:grpSpPr>
+        <a:xfrm>
+          <a:off x="0" y="0"/>
+          <a:ext cx="0" cy="0"/>
+          <a:chOff x="0" y="0"/>
+          <a:chExt cx="0" cy="0"/>
+        </a:xfrm>
+      </p:grpSpPr>
+      <p:sp>
+        <p:nvSpPr>
+          <p:cNvPr id="8" name="Rounded Rectangle 7">
+            <a:extLst>
+              <a:ext uri="{FF2B5EF4-FFF2-40B4-BE49-F238E27FC236}">
+                <a16:creationId xmlns:a16="http://schemas.microsoft.com/office/drawing/2014/main" id="{113C0142-E6EA-5A45-934A-7819FD86E179}"/>
+              </a:ext>
+            </a:extLst>
+          </p:cNvPr>
+          <p:cNvSpPr/>
+          <p:nvPr/>
+        </p:nvSpPr>
+        <p:spPr>
+          <a:xfrm>
+            <a:off x="-1924" y="299243"/>
+            <a:ext cx="2560932" cy="389938"/>
+          </a:xfrm>
+          <a:prstGeom prst="roundRect">
+            <a:avLst/>
+          </a:prstGeom>
+          <a:solidFill>
+            <a:schemeClr val="bg1">
+              <a:lumMod val="85000"/>
+            </a:schemeClr>
+          </a:solidFill>
+          <a:ln>
+            <a:noFill/>
+          </a:ln>
+        </p:spPr>
+        <p:style>
+          <a:lnRef idx="2">
+            <a:schemeClr val="accent1">
+              <a:shade val="50000"/>
+            </a:schemeClr>
+          </a:lnRef>
+          <a:fillRef idx="1">
+            <a:schemeClr val="accent1"/>
+          </a:fillRef>
+          <a:effectRef idx="0">
+            <a:schemeClr val="accent1"/>
+          </a:effectRef>
+          <a:fontRef idx="minor">
+            <a:schemeClr val="lt1"/>
+          </a:fontRef>
+        </p:style>
+        <p:txBody>
+          <a:bodyPr rot="0" spcFirstLastPara="0" vertOverflow="overflow" horzOverflow="overflow" vert="horz" wrap="square" lIns="91440" tIns="45720" rIns="91440" bIns="45720" numCol="1" spcCol="0" rtlCol="0" fromWordArt="0" anchor="ctr" anchorCtr="0" forceAA="0" compatLnSpc="1">
+            <a:prstTxWarp prst="textNoShape">
+              <a:avLst/>
+            </a:prstTxWarp>
+            <a:noAutofit/>
+          </a:bodyPr>
+          <a:lstStyle/>
+          <a:p>
+            <a:pPr algn="ctr"/>
+            <a:r>
+              <a:rPr lang="en-US" sz="1800" b="1" dirty="0">
+                <a:solidFill>
+                  <a:schemeClr val="tx1"/>
+                </a:solidFill>
+                <a:latin typeface="Helvetica" pitchFamily="2" charset="0"/>
+                <a:ea typeface="Helvetica Neue Medium" panose="02000503000000020004" pitchFamily="2" charset="0"/>
+                <a:cs typeface="Helvetica Neue Medium" panose="02000503000000020004" pitchFamily="2" charset="0"/>
+              </a:rPr>
+              <a:t>_____</a:t>
+            </a:r>
+          </a:p>
+        </p:txBody>
+      </p:sp>
+    </p:spTree>
+    <p:extLst>
+      <p:ext uri="{BB962C8B-B14F-4D97-AF65-F5344CB8AC3E}">
+        <p14:creationId xmlns:p14="http://schemas.microsoft.com/office/powerpoint/2010/main" val="1331795784"/>
+      </p:ext>
+    </p:extLst>
+  </p:cSld>
+  <p:clrMapOvr>
+    <a:masterClrMapping/>
+  </p:clrMapOvr>
+</p:sld>
+</file>
+
+<file path=ppt/slides/slide8.xml><?xml version="1.0" encoding="utf-8"?>
 <p:sld xmlns:a="http://schemas.openxmlformats.org/drawingml/2006/main" xmlns:r="http://schemas.openxmlformats.org/officeDocument/2006/relationships" xmlns:p="http://schemas.openxmlformats.org/presentationml/2006/main">
   <p:cSld>
     <p:spTree>
@@ -3871,246 +4962,10 @@
           </a:p>
         </p:txBody>
       </p:sp>
-      <p:sp>
-        <p:nvSpPr>
-          <p:cNvPr id="8" name="Rounded Rectangle 7">
-            <a:extLst>
-              <a:ext uri="{FF2B5EF4-FFF2-40B4-BE49-F238E27FC236}">
-                <a16:creationId xmlns:a16="http://schemas.microsoft.com/office/drawing/2014/main" id="{113C0142-E6EA-5A45-934A-7819FD86E179}"/>
-              </a:ext>
-            </a:extLst>
-          </p:cNvPr>
-          <p:cNvSpPr/>
-          <p:nvPr/>
-        </p:nvSpPr>
-        <p:spPr>
-          <a:xfrm>
-            <a:off x="-1924" y="299243"/>
-            <a:ext cx="2560932" cy="389938"/>
-          </a:xfrm>
-          <a:prstGeom prst="roundRect">
-            <a:avLst/>
-          </a:prstGeom>
-          <a:solidFill>
-            <a:schemeClr val="bg1">
-              <a:lumMod val="85000"/>
-            </a:schemeClr>
-          </a:solidFill>
-          <a:ln>
-            <a:noFill/>
-          </a:ln>
-        </p:spPr>
-        <p:style>
-          <a:lnRef idx="2">
-            <a:schemeClr val="accent1">
-              <a:shade val="50000"/>
-            </a:schemeClr>
-          </a:lnRef>
-          <a:fillRef idx="1">
-            <a:schemeClr val="accent1"/>
-          </a:fillRef>
-          <a:effectRef idx="0">
-            <a:schemeClr val="accent1"/>
-          </a:effectRef>
-          <a:fontRef idx="minor">
-            <a:schemeClr val="lt1"/>
-          </a:fontRef>
-        </p:style>
-        <p:txBody>
-          <a:bodyPr rot="0" spcFirstLastPara="0" vertOverflow="overflow" horzOverflow="overflow" vert="horz" wrap="square" lIns="91440" tIns="45720" rIns="91440" bIns="45720" numCol="1" spcCol="0" rtlCol="0" fromWordArt="0" anchor="ctr" anchorCtr="0" forceAA="0" compatLnSpc="1">
-            <a:prstTxWarp prst="textNoShape">
-              <a:avLst/>
-            </a:prstTxWarp>
-            <a:noAutofit/>
-          </a:bodyPr>
-          <a:lstStyle/>
-          <a:p>
-            <a:pPr algn="ctr"/>
-            <a:r>
-              <a:rPr lang="en-US" sz="1800" b="1" dirty="0">
-                <a:solidFill>
-                  <a:schemeClr val="tx1"/>
-                </a:solidFill>
-                <a:latin typeface="Helvetica" pitchFamily="2" charset="0"/>
-                <a:ea typeface="Helvetica Neue Medium" panose="02000503000000020004" pitchFamily="2" charset="0"/>
-                <a:cs typeface="Helvetica Neue Medium" panose="02000503000000020004" pitchFamily="2" charset="0"/>
-              </a:rPr>
-              <a:t>Low interest rates</a:t>
-            </a:r>
-          </a:p>
-        </p:txBody>
-      </p:sp>
-      <p:cxnSp>
-        <p:nvCxnSpPr>
-          <p:cNvPr id="10" name="Straight Arrow Connector 9">
-            <a:extLst>
-              <a:ext uri="{FF2B5EF4-FFF2-40B4-BE49-F238E27FC236}">
-                <a16:creationId xmlns:a16="http://schemas.microsoft.com/office/drawing/2014/main" id="{4C7C0219-B0CE-8D48-AD4E-6100967E24AC}"/>
-              </a:ext>
-            </a:extLst>
-          </p:cNvPr>
-          <p:cNvCxnSpPr>
-            <a:cxnSpLocks/>
-            <a:stCxn id="8" idx="3"/>
-            <a:endCxn id="6" idx="1"/>
-          </p:cNvCxnSpPr>
-          <p:nvPr/>
-        </p:nvCxnSpPr>
-        <p:spPr>
-          <a:xfrm flipV="1">
-            <a:off x="2559009" y="187095"/>
-            <a:ext cx="900713" cy="307117"/>
-          </a:xfrm>
-          <a:prstGeom prst="straightConnector1">
-            <a:avLst/>
-          </a:prstGeom>
-          <a:ln w="28575">
-            <a:solidFill>
-              <a:schemeClr val="tx1">
-                <a:lumMod val="75000"/>
-                <a:lumOff val="25000"/>
-              </a:schemeClr>
-            </a:solidFill>
-            <a:tailEnd type="triangle"/>
-          </a:ln>
-        </p:spPr>
-        <p:style>
-          <a:lnRef idx="1">
-            <a:schemeClr val="accent1"/>
-          </a:lnRef>
-          <a:fillRef idx="0">
-            <a:schemeClr val="accent1"/>
-          </a:fillRef>
-          <a:effectRef idx="0">
-            <a:schemeClr val="accent1"/>
-          </a:effectRef>
-          <a:fontRef idx="minor">
-            <a:schemeClr val="tx1"/>
-          </a:fontRef>
-        </p:style>
-      </p:cxnSp>
-      <p:cxnSp>
-        <p:nvCxnSpPr>
-          <p:cNvPr id="12" name="Straight Arrow Connector 11">
-            <a:extLst>
-              <a:ext uri="{FF2B5EF4-FFF2-40B4-BE49-F238E27FC236}">
-                <a16:creationId xmlns:a16="http://schemas.microsoft.com/office/drawing/2014/main" id="{722B9279-04EE-964D-87B7-6B94705E504E}"/>
-              </a:ext>
-            </a:extLst>
-          </p:cNvPr>
-          <p:cNvCxnSpPr>
-            <a:cxnSpLocks/>
-            <a:stCxn id="8" idx="3"/>
-            <a:endCxn id="17" idx="1"/>
-          </p:cNvCxnSpPr>
-          <p:nvPr/>
-        </p:nvCxnSpPr>
-        <p:spPr>
-          <a:xfrm>
-            <a:off x="2559008" y="494212"/>
-            <a:ext cx="900712" cy="307117"/>
-          </a:xfrm>
-          <a:prstGeom prst="straightConnector1">
-            <a:avLst/>
-          </a:prstGeom>
-          <a:ln w="28575">
-            <a:solidFill>
-              <a:schemeClr val="tx1">
-                <a:lumMod val="75000"/>
-                <a:lumOff val="25000"/>
-              </a:schemeClr>
-            </a:solidFill>
-            <a:tailEnd type="triangle"/>
-          </a:ln>
-        </p:spPr>
-        <p:style>
-          <a:lnRef idx="1">
-            <a:schemeClr val="accent1"/>
-          </a:lnRef>
-          <a:fillRef idx="0">
-            <a:schemeClr val="accent1"/>
-          </a:fillRef>
-          <a:effectRef idx="0">
-            <a:schemeClr val="accent1"/>
-          </a:effectRef>
-          <a:fontRef idx="minor">
-            <a:schemeClr val="tx1"/>
-          </a:fontRef>
-        </p:style>
-      </p:cxnSp>
-      <p:sp>
-        <p:nvSpPr>
-          <p:cNvPr id="17" name="Rounded Rectangle 16">
-            <a:extLst>
-              <a:ext uri="{FF2B5EF4-FFF2-40B4-BE49-F238E27FC236}">
-                <a16:creationId xmlns:a16="http://schemas.microsoft.com/office/drawing/2014/main" id="{8E9AE9C6-EBE8-8F46-A7A2-D2E2E2C711E9}"/>
-              </a:ext>
-            </a:extLst>
-          </p:cNvPr>
-          <p:cNvSpPr/>
-          <p:nvPr/>
-        </p:nvSpPr>
-        <p:spPr>
-          <a:xfrm>
-            <a:off x="3459721" y="614234"/>
-            <a:ext cx="3206191" cy="374190"/>
-          </a:xfrm>
-          <a:prstGeom prst="roundRect">
-            <a:avLst/>
-          </a:prstGeom>
-          <a:solidFill>
-            <a:schemeClr val="bg1">
-              <a:lumMod val="85000"/>
-            </a:schemeClr>
-          </a:solidFill>
-          <a:ln>
-            <a:noFill/>
-          </a:ln>
-        </p:spPr>
-        <p:style>
-          <a:lnRef idx="2">
-            <a:schemeClr val="accent1">
-              <a:shade val="50000"/>
-            </a:schemeClr>
-          </a:lnRef>
-          <a:fillRef idx="1">
-            <a:schemeClr val="accent1"/>
-          </a:fillRef>
-          <a:effectRef idx="0">
-            <a:schemeClr val="accent1"/>
-          </a:effectRef>
-          <a:fontRef idx="minor">
-            <a:schemeClr val="lt1"/>
-          </a:fontRef>
-        </p:style>
-        <p:txBody>
-          <a:bodyPr rot="0" spcFirstLastPara="0" vertOverflow="overflow" horzOverflow="overflow" vert="horz" wrap="square" lIns="91440" tIns="45720" rIns="91440" bIns="45720" numCol="1" spcCol="0" rtlCol="0" fromWordArt="0" anchor="ctr" anchorCtr="0" forceAA="0" compatLnSpc="1">
-            <a:prstTxWarp prst="textNoShape">
-              <a:avLst/>
-            </a:prstTxWarp>
-            <a:noAutofit/>
-          </a:bodyPr>
-          <a:lstStyle/>
-          <a:p>
-            <a:pPr algn="ctr"/>
-            <a:r>
-              <a:rPr lang="en-US" sz="1800" b="1" dirty="0">
-                <a:solidFill>
-                  <a:schemeClr val="tx1"/>
-                </a:solidFill>
-                <a:latin typeface="Helvetica" pitchFamily="2" charset="0"/>
-                <a:ea typeface="Helvetica Neue Medium" panose="02000503000000020004" pitchFamily="2" charset="0"/>
-                <a:cs typeface="Helvetica Neue Medium" panose="02000503000000020004" pitchFamily="2" charset="0"/>
-              </a:rPr>
-              <a:t>???</a:t>
-            </a:r>
-          </a:p>
-        </p:txBody>
-      </p:sp>
     </p:spTree>
     <p:extLst>
       <p:ext uri="{BB962C8B-B14F-4D97-AF65-F5344CB8AC3E}">
-        <p14:creationId xmlns:p14="http://schemas.microsoft.com/office/powerpoint/2010/main" val="3799323358"/>
+        <p14:creationId xmlns:p14="http://schemas.microsoft.com/office/powerpoint/2010/main" val="862577098"/>
       </p:ext>
     </p:extLst>
   </p:cSld>
@@ -4120,7 +4975,7 @@
 </p:sld>
 </file>
 
-<file path=ppt/slides/slide4.xml><?xml version="1.0" encoding="utf-8"?>
+<file path=ppt/slides/slide9.xml><?xml version="1.0" encoding="utf-8"?>
 <p:sld xmlns:a="http://schemas.openxmlformats.org/drawingml/2006/main" xmlns:r="http://schemas.openxmlformats.org/officeDocument/2006/relationships" xmlns:p="http://schemas.openxmlformats.org/presentationml/2006/main">
   <p:cSld>
     <p:spTree>
@@ -4201,243 +5056,7 @@
                 <a:ea typeface="Helvetica Neue Medium" panose="02000503000000020004" pitchFamily="2" charset="0"/>
                 <a:cs typeface="Helvetica Neue Medium" panose="02000503000000020004" pitchFamily="2" charset="0"/>
               </a:rPr>
-              <a:t>???</a:t>
-            </a:r>
-          </a:p>
-        </p:txBody>
-      </p:sp>
-      <p:sp>
-        <p:nvSpPr>
-          <p:cNvPr id="8" name="Rounded Rectangle 7">
-            <a:extLst>
-              <a:ext uri="{FF2B5EF4-FFF2-40B4-BE49-F238E27FC236}">
-                <a16:creationId xmlns:a16="http://schemas.microsoft.com/office/drawing/2014/main" id="{113C0142-E6EA-5A45-934A-7819FD86E179}"/>
-              </a:ext>
-            </a:extLst>
-          </p:cNvPr>
-          <p:cNvSpPr/>
-          <p:nvPr/>
-        </p:nvSpPr>
-        <p:spPr>
-          <a:xfrm>
-            <a:off x="-1924" y="299243"/>
-            <a:ext cx="2560932" cy="389938"/>
-          </a:xfrm>
-          <a:prstGeom prst="roundRect">
-            <a:avLst/>
-          </a:prstGeom>
-          <a:solidFill>
-            <a:schemeClr val="bg1">
-              <a:lumMod val="85000"/>
-            </a:schemeClr>
-          </a:solidFill>
-          <a:ln>
-            <a:noFill/>
-          </a:ln>
-        </p:spPr>
-        <p:style>
-          <a:lnRef idx="2">
-            <a:schemeClr val="accent1">
-              <a:shade val="50000"/>
-            </a:schemeClr>
-          </a:lnRef>
-          <a:fillRef idx="1">
-            <a:schemeClr val="accent1"/>
-          </a:fillRef>
-          <a:effectRef idx="0">
-            <a:schemeClr val="accent1"/>
-          </a:effectRef>
-          <a:fontRef idx="minor">
-            <a:schemeClr val="lt1"/>
-          </a:fontRef>
-        </p:style>
-        <p:txBody>
-          <a:bodyPr rot="0" spcFirstLastPara="0" vertOverflow="overflow" horzOverflow="overflow" vert="horz" wrap="square" lIns="91440" tIns="45720" rIns="91440" bIns="45720" numCol="1" spcCol="0" rtlCol="0" fromWordArt="0" anchor="ctr" anchorCtr="0" forceAA="0" compatLnSpc="1">
-            <a:prstTxWarp prst="textNoShape">
-              <a:avLst/>
-            </a:prstTxWarp>
-            <a:noAutofit/>
-          </a:bodyPr>
-          <a:lstStyle/>
-          <a:p>
-            <a:pPr algn="ctr"/>
-            <a:r>
-              <a:rPr lang="en-US" sz="1800" b="1" dirty="0">
-                <a:solidFill>
-                  <a:schemeClr val="tx1"/>
-                </a:solidFill>
-                <a:latin typeface="Helvetica" pitchFamily="2" charset="0"/>
-                <a:ea typeface="Helvetica Neue Medium" panose="02000503000000020004" pitchFamily="2" charset="0"/>
-                <a:cs typeface="Helvetica Neue Medium" panose="02000503000000020004" pitchFamily="2" charset="0"/>
-              </a:rPr>
-              <a:t>Normal interest rates</a:t>
-            </a:r>
-          </a:p>
-        </p:txBody>
-      </p:sp>
-      <p:cxnSp>
-        <p:nvCxnSpPr>
-          <p:cNvPr id="10" name="Straight Arrow Connector 9">
-            <a:extLst>
-              <a:ext uri="{FF2B5EF4-FFF2-40B4-BE49-F238E27FC236}">
-                <a16:creationId xmlns:a16="http://schemas.microsoft.com/office/drawing/2014/main" id="{4C7C0219-B0CE-8D48-AD4E-6100967E24AC}"/>
-              </a:ext>
-            </a:extLst>
-          </p:cNvPr>
-          <p:cNvCxnSpPr>
-            <a:cxnSpLocks/>
-            <a:stCxn id="8" idx="3"/>
-            <a:endCxn id="6" idx="1"/>
-          </p:cNvCxnSpPr>
-          <p:nvPr/>
-        </p:nvCxnSpPr>
-        <p:spPr>
-          <a:xfrm flipV="1">
-            <a:off x="2559009" y="187095"/>
-            <a:ext cx="900713" cy="307117"/>
-          </a:xfrm>
-          <a:prstGeom prst="straightConnector1">
-            <a:avLst/>
-          </a:prstGeom>
-          <a:ln w="28575">
-            <a:solidFill>
-              <a:schemeClr val="tx1">
-                <a:lumMod val="75000"/>
-                <a:lumOff val="25000"/>
-              </a:schemeClr>
-            </a:solidFill>
-            <a:tailEnd type="triangle"/>
-          </a:ln>
-        </p:spPr>
-        <p:style>
-          <a:lnRef idx="1">
-            <a:schemeClr val="accent1"/>
-          </a:lnRef>
-          <a:fillRef idx="0">
-            <a:schemeClr val="accent1"/>
-          </a:fillRef>
-          <a:effectRef idx="0">
-            <a:schemeClr val="accent1"/>
-          </a:effectRef>
-          <a:fontRef idx="minor">
-            <a:schemeClr val="tx1"/>
-          </a:fontRef>
-        </p:style>
-      </p:cxnSp>
-      <p:cxnSp>
-        <p:nvCxnSpPr>
-          <p:cNvPr id="12" name="Straight Arrow Connector 11">
-            <a:extLst>
-              <a:ext uri="{FF2B5EF4-FFF2-40B4-BE49-F238E27FC236}">
-                <a16:creationId xmlns:a16="http://schemas.microsoft.com/office/drawing/2014/main" id="{722B9279-04EE-964D-87B7-6B94705E504E}"/>
-              </a:ext>
-            </a:extLst>
-          </p:cNvPr>
-          <p:cNvCxnSpPr>
-            <a:cxnSpLocks/>
-            <a:stCxn id="8" idx="3"/>
-            <a:endCxn id="17" idx="1"/>
-          </p:cNvCxnSpPr>
-          <p:nvPr/>
-        </p:nvCxnSpPr>
-        <p:spPr>
-          <a:xfrm>
-            <a:off x="2559008" y="494212"/>
-            <a:ext cx="900712" cy="307117"/>
-          </a:xfrm>
-          <a:prstGeom prst="straightConnector1">
-            <a:avLst/>
-          </a:prstGeom>
-          <a:ln w="28575">
-            <a:solidFill>
-              <a:schemeClr val="tx1">
-                <a:lumMod val="75000"/>
-                <a:lumOff val="25000"/>
-              </a:schemeClr>
-            </a:solidFill>
-            <a:tailEnd type="triangle"/>
-          </a:ln>
-        </p:spPr>
-        <p:style>
-          <a:lnRef idx="1">
-            <a:schemeClr val="accent1"/>
-          </a:lnRef>
-          <a:fillRef idx="0">
-            <a:schemeClr val="accent1"/>
-          </a:fillRef>
-          <a:effectRef idx="0">
-            <a:schemeClr val="accent1"/>
-          </a:effectRef>
-          <a:fontRef idx="minor">
-            <a:schemeClr val="tx1"/>
-          </a:fontRef>
-        </p:style>
-      </p:cxnSp>
-      <p:sp>
-        <p:nvSpPr>
-          <p:cNvPr id="17" name="Rounded Rectangle 16">
-            <a:extLst>
-              <a:ext uri="{FF2B5EF4-FFF2-40B4-BE49-F238E27FC236}">
-                <a16:creationId xmlns:a16="http://schemas.microsoft.com/office/drawing/2014/main" id="{8E9AE9C6-EBE8-8F46-A7A2-D2E2E2C711E9}"/>
-              </a:ext>
-            </a:extLst>
-          </p:cNvPr>
-          <p:cNvSpPr/>
-          <p:nvPr/>
-        </p:nvSpPr>
-        <p:spPr>
-          <a:xfrm>
-            <a:off x="3459721" y="614234"/>
-            <a:ext cx="3206191" cy="374190"/>
-          </a:xfrm>
-          <a:prstGeom prst="roundRect">
-            <a:avLst/>
-          </a:prstGeom>
-          <a:solidFill>
-            <a:schemeClr val="bg1">
-              <a:lumMod val="85000"/>
-            </a:schemeClr>
-          </a:solidFill>
-          <a:ln>
-            <a:noFill/>
-          </a:ln>
-        </p:spPr>
-        <p:style>
-          <a:lnRef idx="2">
-            <a:schemeClr val="accent1">
-              <a:shade val="50000"/>
-            </a:schemeClr>
-          </a:lnRef>
-          <a:fillRef idx="1">
-            <a:schemeClr val="accent1"/>
-          </a:fillRef>
-          <a:effectRef idx="0">
-            <a:schemeClr val="accent1"/>
-          </a:effectRef>
-          <a:fontRef idx="minor">
-            <a:schemeClr val="lt1"/>
-          </a:fontRef>
-        </p:style>
-        <p:txBody>
-          <a:bodyPr rot="0" spcFirstLastPara="0" vertOverflow="overflow" horzOverflow="overflow" vert="horz" wrap="square" lIns="91440" tIns="45720" rIns="91440" bIns="45720" numCol="1" spcCol="0" rtlCol="0" fromWordArt="0" anchor="ctr" anchorCtr="0" forceAA="0" compatLnSpc="1">
-            <a:prstTxWarp prst="textNoShape">
-              <a:avLst/>
-            </a:prstTxWarp>
-            <a:noAutofit/>
-          </a:bodyPr>
-          <a:lstStyle/>
-          <a:p>
-            <a:pPr algn="ctr"/>
-            <a:r>
-              <a:rPr lang="en-US" sz="1800" b="1" dirty="0">
-                <a:solidFill>
-                  <a:schemeClr val="tx1"/>
-                </a:solidFill>
-                <a:latin typeface="Helvetica" pitchFamily="2" charset="0"/>
-                <a:ea typeface="Helvetica Neue Medium" panose="02000503000000020004" pitchFamily="2" charset="0"/>
-                <a:cs typeface="Helvetica Neue Medium" panose="02000503000000020004" pitchFamily="2" charset="0"/>
-              </a:rPr>
-              <a:t>_______</a:t>
+              <a:t>Low retirement savings</a:t>
             </a:r>
           </a:p>
         </p:txBody>
@@ -4445,7 +5064,7 @@
     </p:spTree>
     <p:extLst>
       <p:ext uri="{BB962C8B-B14F-4D97-AF65-F5344CB8AC3E}">
-        <p14:creationId xmlns:p14="http://schemas.microsoft.com/office/powerpoint/2010/main" val="1758836236"/>
+        <p14:creationId xmlns:p14="http://schemas.microsoft.com/office/powerpoint/2010/main" val="1784077048"/>
       </p:ext>
     </p:extLst>
   </p:cSld>

</xml_diff>